<commit_message>
data flow in presentation
</commit_message>
<xml_diff>
--- a/concept_MIS.pptx
+++ b/concept_MIS.pptx
@@ -5,10 +5,10 @@
     <p:sldMasterId id="2147483660" r:id="rId1"/>
   </p:sldMasterIdLst>
   <p:notesMasterIdLst>
-    <p:notesMasterId r:id="rId12"/>
+    <p:notesMasterId r:id="rId14"/>
   </p:notesMasterIdLst>
   <p:handoutMasterIdLst>
-    <p:handoutMasterId r:id="rId13"/>
+    <p:handoutMasterId r:id="rId15"/>
   </p:handoutMasterIdLst>
   <p:sldIdLst>
     <p:sldId id="256" r:id="rId2"/>
@@ -16,11 +16,13 @@
     <p:sldId id="258" r:id="rId4"/>
     <p:sldId id="261" r:id="rId5"/>
     <p:sldId id="259" r:id="rId6"/>
-    <p:sldId id="260" r:id="rId7"/>
-    <p:sldId id="264" r:id="rId8"/>
-    <p:sldId id="265" r:id="rId9"/>
-    <p:sldId id="262" r:id="rId10"/>
-    <p:sldId id="263" r:id="rId11"/>
+    <p:sldId id="266" r:id="rId7"/>
+    <p:sldId id="267" r:id="rId8"/>
+    <p:sldId id="260" r:id="rId9"/>
+    <p:sldId id="265" r:id="rId10"/>
+    <p:sldId id="264" r:id="rId11"/>
+    <p:sldId id="262" r:id="rId12"/>
+    <p:sldId id="263" r:id="rId13"/>
   </p:sldIdLst>
   <p:sldSz cx="9144000" cy="6858000" type="screen4x3"/>
   <p:notesSz cx="6858000" cy="9144000"/>
@@ -119,6 +121,11 @@
       </a:defRPr>
     </a:lvl9pPr>
   </p:defaultTextStyle>
+  <p:extLst>
+    <p:ext uri="{EFAFB233-063F-42B5-8137-9DF3F51BA10A}">
+      <p15:sldGuideLst xmlns:p15="http://schemas.microsoft.com/office/powerpoint/2012/main"/>
+    </p:ext>
+  </p:extLst>
 </p:presentation>
 </file>
 
@@ -339,7 +346,7 @@
           <a:p>
             <a:fld id="{9169395D-E2B0-4237-AD7A-8C1849D22F64}" type="datetimeFigureOut">
               <a:rPr lang="en-GB" smtClean="0"/>
-              <a:t>09/03/2022</a:t>
+              <a:t>10/03/2022</a:t>
             </a:fld>
             <a:endParaRPr lang="en-GB"/>
           </a:p>
@@ -517,7 +524,7 @@
           <a:p>
             <a:fld id="{6B6E652A-6660-4AE5-AF8A-6893B474A450}" type="datetimeFigureOut">
               <a:rPr lang="en-GB" smtClean="0"/>
-              <a:t>09/03/2022</a:t>
+              <a:t>10/03/2022</a:t>
             </a:fld>
             <a:endParaRPr lang="en-GB"/>
           </a:p>
@@ -916,7 +923,7 @@
           <a:p>
             <a:fld id="{D7038028-E2DC-4BD6-A0F0-E47DF81D00A6}" type="datetime1">
               <a:rPr lang="en-GB" smtClean="0"/>
-              <a:t>09/03/2022</a:t>
+              <a:t>10/03/2022</a:t>
             </a:fld>
             <a:endParaRPr lang="en-GB"/>
           </a:p>
@@ -1133,7 +1140,7 @@
           <a:p>
             <a:fld id="{99B8A304-42F4-4AAB-97B5-FCAF486D26D5}" type="datetime1">
               <a:rPr lang="en-GB" smtClean="0"/>
-              <a:t>09/03/2022</a:t>
+              <a:t>10/03/2022</a:t>
             </a:fld>
             <a:endParaRPr lang="en-GB"/>
           </a:p>
@@ -1360,7 +1367,7 @@
           <a:p>
             <a:fld id="{AE117905-617F-4254-BE21-24AE5CB7BB49}" type="datetime1">
               <a:rPr lang="en-GB" smtClean="0"/>
-              <a:t>09/03/2022</a:t>
+              <a:t>10/03/2022</a:t>
             </a:fld>
             <a:endParaRPr lang="en-GB"/>
           </a:p>
@@ -1607,7 +1614,7 @@
           <a:p>
             <a:fld id="{DFEEFC3B-CFA1-4012-945D-1D9C74145041}" type="datetime1">
               <a:rPr lang="en-GB" smtClean="0"/>
-              <a:t>09/03/2022</a:t>
+              <a:t>10/03/2022</a:t>
             </a:fld>
             <a:endParaRPr lang="en-GB"/>
           </a:p>
@@ -1908,7 +1915,7 @@
             <a:fld id="{59A3EB17-AADE-4945-8C6E-C60FF4E6B98C}" type="datetime1">
               <a:rPr lang="en-GB" smtClean="0"/>
               <a:pPr/>
-              <a:t>09/03/2022</a:t>
+              <a:t>10/03/2022</a:t>
             </a:fld>
             <a:endParaRPr lang="en-GB"/>
           </a:p>
@@ -2217,7 +2224,7 @@
             <a:fld id="{6BCCE0D1-5104-444A-AFF2-4E4A58F6AA99}" type="datetime1">
               <a:rPr lang="en-GB" smtClean="0"/>
               <a:pPr/>
-              <a:t>09/03/2022</a:t>
+              <a:t>10/03/2022</a:t>
             </a:fld>
             <a:endParaRPr lang="en-GB"/>
           </a:p>
@@ -2713,7 +2720,7 @@
             <a:fld id="{448784E1-D585-4814-9FCF-A5E106DCF9A9}" type="datetime1">
               <a:rPr lang="en-GB" smtClean="0"/>
               <a:pPr/>
-              <a:t>09/03/2022</a:t>
+              <a:t>10/03/2022</a:t>
             </a:fld>
             <a:endParaRPr lang="en-GB"/>
           </a:p>
@@ -2904,7 +2911,7 @@
             <a:fld id="{242F6B2B-195B-4876-A400-A5DF695BF5E9}" type="datetime1">
               <a:rPr lang="en-GB" smtClean="0"/>
               <a:pPr/>
-              <a:t>09/03/2022</a:t>
+              <a:t>10/03/2022</a:t>
             </a:fld>
             <a:endParaRPr lang="en-GB"/>
           </a:p>
@@ -3374,7 +3381,7 @@
           <a:p>
             <a:fld id="{D8B68028-126B-4766-A2E6-B0A6F04488A3}" type="datetime1">
               <a:rPr lang="en-GB" smtClean="0"/>
-              <a:t>09/03/2022</a:t>
+              <a:t>10/03/2022</a:t>
             </a:fld>
             <a:endParaRPr lang="en-GB"/>
           </a:p>
@@ -3719,7 +3726,7 @@
             <a:fld id="{2C88433F-EC25-4B72-A6DE-B6A90A251B16}" type="datetime1">
               <a:rPr lang="en-GB" smtClean="0"/>
               <a:pPr/>
-              <a:t>09/03/2022</a:t>
+              <a:t>10/03/2022</a:t>
             </a:fld>
             <a:endParaRPr lang="en-GB"/>
           </a:p>
@@ -4049,7 +4056,7 @@
             <a:fld id="{FB49D9F3-6CF2-48A8-8EF1-D94B8E8D34EA}" type="datetime1">
               <a:rPr lang="en-GB" smtClean="0"/>
               <a:pPr/>
-              <a:t>09/03/2022</a:t>
+              <a:t>10/03/2022</a:t>
             </a:fld>
             <a:endParaRPr lang="en-GB"/>
           </a:p>
@@ -4322,7 +4329,7 @@
           <a:p>
             <a:fld id="{909617DA-B1D5-41AE-9504-075C903F1831}" type="datetime1">
               <a:rPr lang="en-GB" smtClean="0"/>
-              <a:t>09/03/2022</a:t>
+              <a:t>10/03/2022</a:t>
             </a:fld>
             <a:endParaRPr lang="en-GB"/>
           </a:p>
@@ -4812,7 +4819,7 @@
                 </a:solidFill>
                 <a:latin typeface="IBM Plex Mono" panose="020B0509050203000203" pitchFamily="49" charset="0"/>
               </a:rPr>
-              <a:t>Andres, Paul, Kerry</a:t>
+              <a:t>Andres, Dercio, Paul, Kerry</a:t>
             </a:r>
             <a:endParaRPr lang="en-GB" sz="1600" dirty="0">
               <a:solidFill>
@@ -5095,6 +5102,388 @@
           <p:cNvPr id="2" name="Title 1">
             <a:extLst>
               <a:ext uri="{FF2B5EF4-FFF2-40B4-BE49-F238E27FC236}">
+                <a16:creationId xmlns:a16="http://schemas.microsoft.com/office/drawing/2014/main" id="{3C2D0ABF-178F-46EF-825C-235F4CA8BB19}"/>
+              </a:ext>
+            </a:extLst>
+          </p:cNvPr>
+          <p:cNvSpPr>
+            <a:spLocks noGrp="1"/>
+          </p:cNvSpPr>
+          <p:nvPr>
+            <p:ph type="title"/>
+          </p:nvPr>
+        </p:nvSpPr>
+        <p:spPr/>
+        <p:txBody>
+          <a:bodyPr/>
+          <a:lstStyle/>
+          <a:p>
+            <a:r>
+              <a:rPr lang="en-150" dirty="0"/>
+              <a:t>Software </a:t>
+            </a:r>
+            <a:endParaRPr lang="en-GB" dirty="0"/>
+          </a:p>
+        </p:txBody>
+      </p:sp>
+      <p:sp>
+        <p:nvSpPr>
+          <p:cNvPr id="3" name="Content Placeholder 2">
+            <a:extLst>
+              <a:ext uri="{FF2B5EF4-FFF2-40B4-BE49-F238E27FC236}">
+                <a16:creationId xmlns:a16="http://schemas.microsoft.com/office/drawing/2014/main" id="{23906B84-CC64-435B-9AA1-4091ABBC2CBB}"/>
+              </a:ext>
+            </a:extLst>
+          </p:cNvPr>
+          <p:cNvSpPr>
+            <a:spLocks noGrp="1"/>
+          </p:cNvSpPr>
+          <p:nvPr>
+            <p:ph idx="1"/>
+          </p:nvPr>
+        </p:nvSpPr>
+        <p:spPr/>
+        <p:txBody>
+          <a:bodyPr>
+            <a:normAutofit fontScale="85000" lnSpcReduction="20000"/>
+          </a:bodyPr>
+          <a:lstStyle/>
+          <a:p>
+            <a:r>
+              <a:rPr lang="en-150" dirty="0"/>
+              <a:t>Zoho creator: create an account for MUVA and set credentials to allow the creation of users, pages, reports (about 240 EUR/month)</a:t>
+            </a:r>
+          </a:p>
+          <a:p>
+            <a:endParaRPr lang="en-150" dirty="0"/>
+          </a:p>
+          <a:p>
+            <a:r>
+              <a:rPr lang="en-150" dirty="0"/>
+              <a:t>A server to host dashboards and a domain for the data entry.(currently using mine) (about 20 EUR/month)</a:t>
+            </a:r>
+          </a:p>
+          <a:p>
+            <a:endParaRPr lang="en-150" dirty="0"/>
+          </a:p>
+          <a:p>
+            <a:r>
+              <a:rPr lang="en-150" dirty="0"/>
+              <a:t>Survey Solutions server (about 20 EUR /month). </a:t>
+            </a:r>
+            <a:r>
+              <a:rPr lang="en-GB" dirty="0"/>
+              <a:t>C</a:t>
+            </a:r>
+            <a:r>
+              <a:rPr lang="en-150" dirty="0"/>
+              <a:t>currently using mine</a:t>
+            </a:r>
+          </a:p>
+          <a:p>
+            <a:endParaRPr lang="en-150" dirty="0"/>
+          </a:p>
+          <a:p>
+            <a:r>
+              <a:rPr lang="en-150" dirty="0"/>
+              <a:t>Stata/R</a:t>
+            </a:r>
+          </a:p>
+          <a:p>
+            <a:pPr marL="0" indent="0">
+              <a:buNone/>
+            </a:pPr>
+            <a:endParaRPr lang="en-150" dirty="0"/>
+          </a:p>
+          <a:p>
+            <a:endParaRPr lang="en-GB" dirty="0"/>
+          </a:p>
+        </p:txBody>
+      </p:sp>
+      <p:sp>
+        <p:nvSpPr>
+          <p:cNvPr id="4" name="Slide Number Placeholder 3">
+            <a:extLst>
+              <a:ext uri="{FF2B5EF4-FFF2-40B4-BE49-F238E27FC236}">
+                <a16:creationId xmlns:a16="http://schemas.microsoft.com/office/drawing/2014/main" id="{25808265-F46B-48B3-9050-FA2114FD94D0}"/>
+              </a:ext>
+            </a:extLst>
+          </p:cNvPr>
+          <p:cNvSpPr>
+            <a:spLocks noGrp="1"/>
+          </p:cNvSpPr>
+          <p:nvPr>
+            <p:ph type="sldNum" sz="quarter" idx="12"/>
+          </p:nvPr>
+        </p:nvSpPr>
+        <p:spPr/>
+        <p:txBody>
+          <a:bodyPr/>
+          <a:lstStyle/>
+          <a:p>
+            <a:fld id="{4847D3C8-23C8-4144-AEB0-562812491F0A}" type="slidenum">
+              <a:rPr lang="en-GB" smtClean="0"/>
+              <a:t>10</a:t>
+            </a:fld>
+            <a:endParaRPr lang="en-GB"/>
+          </a:p>
+        </p:txBody>
+      </p:sp>
+    </p:spTree>
+    <p:extLst>
+      <p:ext uri="{BB962C8B-B14F-4D97-AF65-F5344CB8AC3E}">
+        <p14:creationId xmlns:p14="http://schemas.microsoft.com/office/powerpoint/2010/main" val="3054526697"/>
+      </p:ext>
+    </p:extLst>
+  </p:cSld>
+  <p:clrMapOvr>
+    <a:masterClrMapping/>
+  </p:clrMapOvr>
+  <p:extLst>
+    <p:ext uri="{6950BFC3-D8DA-4A85-94F7-54DA5524770B}">
+      <p188:commentRel xmlns:p188="http://schemas.microsoft.com/office/powerpoint/2018/8/main" r:id="rId2"/>
+    </p:ext>
+  </p:extLst>
+</p:sld>
+</file>
+
+<file path=ppt/slides/slide11.xml><?xml version="1.0" encoding="utf-8"?>
+<p:sld xmlns:a="http://schemas.openxmlformats.org/drawingml/2006/main" xmlns:r="http://schemas.openxmlformats.org/officeDocument/2006/relationships" xmlns:p="http://schemas.openxmlformats.org/presentationml/2006/main">
+  <p:cSld>
+    <p:spTree>
+      <p:nvGrpSpPr>
+        <p:cNvPr id="1" name=""/>
+        <p:cNvGrpSpPr/>
+        <p:nvPr/>
+      </p:nvGrpSpPr>
+      <p:grpSpPr>
+        <a:xfrm>
+          <a:off x="0" y="0"/>
+          <a:ext cx="0" cy="0"/>
+          <a:chOff x="0" y="0"/>
+          <a:chExt cx="0" cy="0"/>
+        </a:xfrm>
+      </p:grpSpPr>
+      <p:sp>
+        <p:nvSpPr>
+          <p:cNvPr id="2" name="Title 1">
+            <a:extLst>
+              <a:ext uri="{FF2B5EF4-FFF2-40B4-BE49-F238E27FC236}">
+                <a16:creationId xmlns:a16="http://schemas.microsoft.com/office/drawing/2014/main" id="{B5189EB2-DCF9-452B-89CA-776943195F33}"/>
+              </a:ext>
+            </a:extLst>
+          </p:cNvPr>
+          <p:cNvSpPr>
+            <a:spLocks noGrp="1"/>
+          </p:cNvSpPr>
+          <p:nvPr>
+            <p:ph type="title"/>
+          </p:nvPr>
+        </p:nvSpPr>
+        <p:spPr/>
+        <p:txBody>
+          <a:bodyPr/>
+          <a:lstStyle/>
+          <a:p>
+            <a:r>
+              <a:rPr lang="en-150" dirty="0"/>
+              <a:t>Pilot phase</a:t>
+            </a:r>
+            <a:endParaRPr lang="en-GB" dirty="0"/>
+          </a:p>
+        </p:txBody>
+      </p:sp>
+      <p:sp>
+        <p:nvSpPr>
+          <p:cNvPr id="3" name="Content Placeholder 2">
+            <a:extLst>
+              <a:ext uri="{FF2B5EF4-FFF2-40B4-BE49-F238E27FC236}">
+                <a16:creationId xmlns:a16="http://schemas.microsoft.com/office/drawing/2014/main" id="{A4353444-3D10-44F5-B8E1-2ECF52F48634}"/>
+              </a:ext>
+            </a:extLst>
+          </p:cNvPr>
+          <p:cNvSpPr>
+            <a:spLocks noGrp="1"/>
+          </p:cNvSpPr>
+          <p:nvPr>
+            <p:ph idx="1"/>
+          </p:nvPr>
+        </p:nvSpPr>
+        <p:spPr/>
+        <p:txBody>
+          <a:bodyPr>
+            <a:normAutofit fontScale="70000" lnSpcReduction="20000"/>
+          </a:bodyPr>
+          <a:lstStyle/>
+          <a:p>
+            <a:r>
+              <a:rPr lang="en-150" dirty="0"/>
+              <a:t>Log all MUVA projects and test which information is relevant</a:t>
+            </a:r>
+          </a:p>
+          <a:p>
+            <a:pPr marL="0" indent="0">
+              <a:buNone/>
+            </a:pPr>
+            <a:endParaRPr lang="en-150" dirty="0"/>
+          </a:p>
+          <a:p>
+            <a:r>
+              <a:rPr lang="en-150" dirty="0"/>
+              <a:t>Choose 2 active projects</a:t>
+            </a:r>
+          </a:p>
+          <a:p>
+            <a:endParaRPr lang="en-150" dirty="0"/>
+          </a:p>
+          <a:p>
+            <a:r>
+              <a:rPr lang="en-GB" dirty="0"/>
+              <a:t>T</a:t>
+            </a:r>
+            <a:r>
+              <a:rPr lang="en-150" dirty="0" err="1"/>
+              <a:t>est</a:t>
+            </a:r>
+            <a:r>
+              <a:rPr lang="en-150" dirty="0"/>
+              <a:t> the unique ID </a:t>
+            </a:r>
+            <a:r>
+              <a:rPr lang="en-150"/>
+              <a:t>system </a:t>
+            </a:r>
+            <a:endParaRPr lang="en-150" dirty="0"/>
+          </a:p>
+          <a:p>
+            <a:pPr marL="0" indent="0">
+              <a:buNone/>
+            </a:pPr>
+            <a:r>
+              <a:rPr lang="en-150" dirty="0"/>
+              <a:t> </a:t>
+            </a:r>
+          </a:p>
+          <a:p>
+            <a:r>
+              <a:rPr lang="en-150" dirty="0"/>
+              <a:t>Test ongoing monitoring of attendance or transfers</a:t>
+            </a:r>
+          </a:p>
+          <a:p>
+            <a:pPr marL="0" indent="0">
+              <a:buNone/>
+            </a:pPr>
+            <a:endParaRPr lang="en-150" dirty="0"/>
+          </a:p>
+          <a:p>
+            <a:r>
+              <a:rPr lang="en-150" dirty="0"/>
+              <a:t>Test process of ongoing learning</a:t>
+            </a:r>
+          </a:p>
+          <a:p>
+            <a:pPr marL="0" indent="0">
+              <a:buNone/>
+            </a:pPr>
+            <a:endParaRPr lang="en-150" dirty="0"/>
+          </a:p>
+          <a:p>
+            <a:r>
+              <a:rPr lang="en-150" dirty="0"/>
+              <a:t>Test </a:t>
+            </a:r>
+            <a:r>
+              <a:rPr lang="en-150" dirty="0" err="1"/>
+              <a:t>rastreamiento</a:t>
+            </a:r>
+            <a:r>
+              <a:rPr lang="en-150" dirty="0"/>
+              <a:t> </a:t>
+            </a:r>
+            <a:r>
+              <a:rPr lang="en-150" dirty="0" err="1"/>
+              <a:t>sistemico</a:t>
+            </a:r>
+            <a:endParaRPr lang="en-150" dirty="0"/>
+          </a:p>
+          <a:p>
+            <a:pPr marL="0" indent="0">
+              <a:buNone/>
+            </a:pPr>
+            <a:endParaRPr lang="en-GB" dirty="0"/>
+          </a:p>
+        </p:txBody>
+      </p:sp>
+      <p:sp>
+        <p:nvSpPr>
+          <p:cNvPr id="4" name="Slide Number Placeholder 3">
+            <a:extLst>
+              <a:ext uri="{FF2B5EF4-FFF2-40B4-BE49-F238E27FC236}">
+                <a16:creationId xmlns:a16="http://schemas.microsoft.com/office/drawing/2014/main" id="{5F4500E1-976F-4FAB-9146-1DE2F5420CC4}"/>
+              </a:ext>
+            </a:extLst>
+          </p:cNvPr>
+          <p:cNvSpPr>
+            <a:spLocks noGrp="1"/>
+          </p:cNvSpPr>
+          <p:nvPr>
+            <p:ph type="sldNum" sz="quarter" idx="12"/>
+          </p:nvPr>
+        </p:nvSpPr>
+        <p:spPr/>
+        <p:txBody>
+          <a:bodyPr/>
+          <a:lstStyle/>
+          <a:p>
+            <a:fld id="{4847D3C8-23C8-4144-AEB0-562812491F0A}" type="slidenum">
+              <a:rPr lang="en-GB" smtClean="0"/>
+              <a:t>11</a:t>
+            </a:fld>
+            <a:endParaRPr lang="en-GB"/>
+          </a:p>
+        </p:txBody>
+      </p:sp>
+    </p:spTree>
+    <p:extLst>
+      <p:ext uri="{BB962C8B-B14F-4D97-AF65-F5344CB8AC3E}">
+        <p14:creationId xmlns:p14="http://schemas.microsoft.com/office/powerpoint/2010/main" val="1454998199"/>
+      </p:ext>
+    </p:extLst>
+  </p:cSld>
+  <p:clrMapOvr>
+    <a:masterClrMapping/>
+  </p:clrMapOvr>
+  <p:extLst>
+    <p:ext uri="{6950BFC3-D8DA-4A85-94F7-54DA5524770B}">
+      <p188:commentRel xmlns:p188="http://schemas.microsoft.com/office/powerpoint/2018/8/main" r:id="rId2"/>
+    </p:ext>
+  </p:extLst>
+</p:sld>
+</file>
+
+<file path=ppt/slides/slide12.xml><?xml version="1.0" encoding="utf-8"?>
+<p:sld xmlns:a="http://schemas.openxmlformats.org/drawingml/2006/main" xmlns:r="http://schemas.openxmlformats.org/officeDocument/2006/relationships" xmlns:p="http://schemas.openxmlformats.org/presentationml/2006/main">
+  <p:cSld>
+    <p:spTree>
+      <p:nvGrpSpPr>
+        <p:cNvPr id="1" name=""/>
+        <p:cNvGrpSpPr/>
+        <p:nvPr/>
+      </p:nvGrpSpPr>
+      <p:grpSpPr>
+        <a:xfrm>
+          <a:off x="0" y="0"/>
+          <a:ext cx="0" cy="0"/>
+          <a:chOff x="0" y="0"/>
+          <a:chExt cx="0" cy="0"/>
+        </a:xfrm>
+      </p:grpSpPr>
+      <p:sp>
+        <p:nvSpPr>
+          <p:cNvPr id="2" name="Title 1">
+            <a:extLst>
+              <a:ext uri="{FF2B5EF4-FFF2-40B4-BE49-F238E27FC236}">
                 <a16:creationId xmlns:a16="http://schemas.microsoft.com/office/drawing/2014/main" id="{6D6AFB9D-5D16-40CC-984C-D677DF5F3222}"/>
               </a:ext>
             </a:extLst>
@@ -5197,7 +5586,7 @@
           <a:p>
             <a:fld id="{4847D3C8-23C8-4144-AEB0-562812491F0A}" type="slidenum">
               <a:rPr lang="en-GB" smtClean="0"/>
-              <a:t>10</a:t>
+              <a:t>12</a:t>
             </a:fld>
             <a:endParaRPr lang="en-GB"/>
           </a:p>
@@ -5539,14 +5928,14 @@
           <p:nvPr>
             <p:extLst>
               <p:ext uri="{D42A27DB-BD31-4B8C-83A1-F6EECF244321}">
-                <p14:modId xmlns:p14="http://schemas.microsoft.com/office/powerpoint/2010/main" val="1995692563"/>
+                <p14:modId xmlns:p14="http://schemas.microsoft.com/office/powerpoint/2010/main" val="2036312619"/>
               </p:ext>
             </p:extLst>
           </p:nvPr>
         </p:nvGraphicFramePr>
         <p:xfrm>
           <a:off x="628650" y="1806099"/>
-          <a:ext cx="7886691" cy="3666133"/>
+          <a:ext cx="7886689" cy="3666133"/>
         </p:xfrm>
         <a:graphic>
           <a:graphicData uri="http://schemas.openxmlformats.org/drawingml/2006/table">
@@ -5555,91 +5944,98 @@
                 <a:tableStyleId>{5940675A-B579-460E-94D1-54222C63F5DA}</a:tableStyleId>
               </a:tblPr>
               <a:tblGrid>
-                <a:gridCol w="2309592">
+                <a:gridCol w="2181063">
                   <a:extLst>
                     <a:ext uri="{9D8B030D-6E8A-4147-A177-3AD203B41FA5}">
                       <a16:colId xmlns:a16="http://schemas.microsoft.com/office/drawing/2014/main" val="3130120970"/>
                     </a:ext>
                   </a:extLst>
                 </a:gridCol>
-                <a:gridCol w="464758">
+                <a:gridCol w="438894">
                   <a:extLst>
                     <a:ext uri="{9D8B030D-6E8A-4147-A177-3AD203B41FA5}">
                       <a16:colId xmlns:a16="http://schemas.microsoft.com/office/drawing/2014/main" val="614686931"/>
                     </a:ext>
                   </a:extLst>
                 </a:gridCol>
-                <a:gridCol w="464758">
+                <a:gridCol w="438894">
                   <a:extLst>
                     <a:ext uri="{9D8B030D-6E8A-4147-A177-3AD203B41FA5}">
                       <a16:colId xmlns:a16="http://schemas.microsoft.com/office/drawing/2014/main" val="266590925"/>
                     </a:ext>
                   </a:extLst>
                 </a:gridCol>
-                <a:gridCol w="536509">
+                <a:gridCol w="506652">
                   <a:extLst>
                     <a:ext uri="{9D8B030D-6E8A-4147-A177-3AD203B41FA5}">
                       <a16:colId xmlns:a16="http://schemas.microsoft.com/office/drawing/2014/main" val="2659824060"/>
                     </a:ext>
                   </a:extLst>
                 </a:gridCol>
-                <a:gridCol w="428884">
+                <a:gridCol w="405017">
                   <a:extLst>
                     <a:ext uri="{9D8B030D-6E8A-4147-A177-3AD203B41FA5}">
                       <a16:colId xmlns:a16="http://schemas.microsoft.com/office/drawing/2014/main" val="4089881877"/>
                     </a:ext>
                   </a:extLst>
                 </a:gridCol>
-                <a:gridCol w="428884">
+                <a:gridCol w="405017">
                   <a:extLst>
                     <a:ext uri="{9D8B030D-6E8A-4147-A177-3AD203B41FA5}">
                       <a16:colId xmlns:a16="http://schemas.microsoft.com/office/drawing/2014/main" val="1487171849"/>
                     </a:ext>
                   </a:extLst>
                 </a:gridCol>
-                <a:gridCol w="464758">
+                <a:gridCol w="438894">
                   <a:extLst>
                     <a:ext uri="{9D8B030D-6E8A-4147-A177-3AD203B41FA5}">
                       <a16:colId xmlns:a16="http://schemas.microsoft.com/office/drawing/2014/main" val="3613738302"/>
                     </a:ext>
                   </a:extLst>
                 </a:gridCol>
-                <a:gridCol w="464758">
+                <a:gridCol w="438894">
                   <a:extLst>
                     <a:ext uri="{9D8B030D-6E8A-4147-A177-3AD203B41FA5}">
                       <a16:colId xmlns:a16="http://schemas.microsoft.com/office/drawing/2014/main" val="691158745"/>
                     </a:ext>
                   </a:extLst>
                 </a:gridCol>
-                <a:gridCol w="464758">
+                <a:gridCol w="438894">
+                  <a:extLst>
+                    <a:ext uri="{9D8B030D-6E8A-4147-A177-3AD203B41FA5}">
+                      <a16:colId xmlns:a16="http://schemas.microsoft.com/office/drawing/2014/main" val="1385907624"/>
+                    </a:ext>
+                  </a:extLst>
+                </a:gridCol>
+                <a:gridCol w="438894">
                   <a:extLst>
                     <a:ext uri="{9D8B030D-6E8A-4147-A177-3AD203B41FA5}">
                       <a16:colId xmlns:a16="http://schemas.microsoft.com/office/drawing/2014/main" val="4110703351"/>
                     </a:ext>
                   </a:extLst>
                 </a:gridCol>
-                <a:gridCol w="464758">
+                <a:gridCol w="438894">
                   <a:extLst>
                     <a:ext uri="{9D8B030D-6E8A-4147-A177-3AD203B41FA5}">
                       <a16:colId xmlns:a16="http://schemas.microsoft.com/office/drawing/2014/main" val="4221857449"/>
                     </a:ext>
                   </a:extLst>
                 </a:gridCol>
-                <a:gridCol w="464758">
+                <a:gridCol w="438894">
                   <a:extLst>
                     <a:ext uri="{9D8B030D-6E8A-4147-A177-3AD203B41FA5}">
                       <a16:colId xmlns:a16="http://schemas.microsoft.com/office/drawing/2014/main" val="365988027"/>
                     </a:ext>
                   </a:extLst>
                 </a:gridCol>
-                <a:gridCol w="464758">
+                <a:gridCol w="438894">
                   <a:extLst>
                     <a:ext uri="{9D8B030D-6E8A-4147-A177-3AD203B41FA5}">
                       <a16:colId xmlns:a16="http://schemas.microsoft.com/office/drawing/2014/main" val="1575108350"/>
                     </a:ext>
                   </a:extLst>
                 </a:gridCol>
-                <a:gridCol w="464758">
+                <a:gridCol w="438894">
                   <a:extLst>
                     <a:ext uri="{9D8B030D-6E8A-4147-A177-3AD203B41FA5}">
                       <a16:colId xmlns:a16="http://schemas.microsoft.com/office/drawing/2014/main" val="150941385"/>
@@ -5784,13 +6180,13 @@
                     <a:p>
                       <a:pPr algn="ctr"/>
                       <a:r>
-                        <a:rPr lang="en-150" sz="1200" dirty="0">
+                        <a:rPr lang="en-150" sz="1200" dirty="0" err="1">
                           <a:solidFill>
                             <a:schemeClr val="bg1"/>
                           </a:solidFill>
                           <a:latin typeface="IBM Plex Mono" panose="020B0509050203000203" pitchFamily="49" charset="0"/>
                         </a:rPr>
-                        <a:t>Registration</a:t>
+                        <a:t>Registro</a:t>
                       </a:r>
                       <a:endParaRPr lang="en-GB" sz="1200" dirty="0">
                         <a:solidFill>
@@ -6183,6 +6579,80 @@
                     <a:p>
                       <a:pPr algn="ctr"/>
                       <a:r>
+                        <a:rPr lang="en-150" sz="1200" dirty="0" err="1">
+                          <a:solidFill>
+                            <a:schemeClr val="bg1"/>
+                          </a:solidFill>
+                          <a:latin typeface="IBM Plex Mono" panose="020B0509050203000203" pitchFamily="49" charset="0"/>
+                        </a:rPr>
+                        <a:t>Visitas</a:t>
+                      </a:r>
+                      <a:r>
+                        <a:rPr lang="en-150" sz="1200" dirty="0">
+                          <a:solidFill>
+                            <a:schemeClr val="bg1"/>
+                          </a:solidFill>
+                          <a:latin typeface="IBM Plex Mono" panose="020B0509050203000203" pitchFamily="49" charset="0"/>
+                        </a:rPr>
+                        <a:t> Dom</a:t>
+                      </a:r>
+                      <a:endParaRPr lang="en-GB" sz="1200" dirty="0">
+                        <a:solidFill>
+                          <a:schemeClr val="bg1"/>
+                        </a:solidFill>
+                        <a:latin typeface="IBM Plex Mono" panose="020B0509050203000203" pitchFamily="49" charset="0"/>
+                      </a:endParaRPr>
+                    </a:p>
+                  </a:txBody>
+                  <a:tcPr vert="vert270">
+                    <a:lnL w="12700" cap="flat" cmpd="sng" algn="ctr">
+                      <a:solidFill>
+                        <a:schemeClr val="bg1"/>
+                      </a:solidFill>
+                      <a:prstDash val="solid"/>
+                      <a:round/>
+                      <a:headEnd type="none" w="med" len="med"/>
+                      <a:tailEnd type="none" w="med" len="med"/>
+                    </a:lnL>
+                    <a:lnR w="12700" cap="flat" cmpd="sng" algn="ctr">
+                      <a:solidFill>
+                        <a:schemeClr val="bg1"/>
+                      </a:solidFill>
+                      <a:prstDash val="solid"/>
+                      <a:round/>
+                      <a:headEnd type="none" w="med" len="med"/>
+                      <a:tailEnd type="none" w="med" len="med"/>
+                    </a:lnR>
+                    <a:lnT w="12700" cap="flat" cmpd="sng" algn="ctr">
+                      <a:solidFill>
+                        <a:schemeClr val="bg1"/>
+                      </a:solidFill>
+                      <a:prstDash val="solid"/>
+                      <a:round/>
+                      <a:headEnd type="none" w="med" len="med"/>
+                      <a:tailEnd type="none" w="med" len="med"/>
+                    </a:lnT>
+                    <a:lnB w="12700" cap="flat" cmpd="sng" algn="ctr">
+                      <a:solidFill>
+                        <a:schemeClr val="bg1"/>
+                      </a:solidFill>
+                      <a:prstDash val="solid"/>
+                      <a:round/>
+                      <a:headEnd type="none" w="med" len="med"/>
+                      <a:tailEnd type="none" w="med" len="med"/>
+                    </a:lnB>
+                    <a:solidFill>
+                      <a:schemeClr val="tx1"/>
+                    </a:solidFill>
+                  </a:tcPr>
+                </a:tc>
+                <a:tc>
+                  <a:txBody>
+                    <a:bodyPr/>
+                    <a:lstStyle/>
+                    <a:p>
+                      <a:pPr algn="ctr"/>
+                      <a:r>
                         <a:rPr lang="en-150" sz="1200" dirty="0">
                           <a:solidFill>
                             <a:schemeClr val="bg1"/>
@@ -6671,6 +7141,55 @@
                     <a:lstStyle/>
                     <a:p>
                       <a:pPr algn="ctr"/>
+                      <a:endParaRPr lang="en-GB" dirty="0"/>
+                    </a:p>
+                  </a:txBody>
+                  <a:tcPr anchor="ctr">
+                    <a:lnL w="12700" cap="flat" cmpd="sng" algn="ctr">
+                      <a:solidFill>
+                        <a:schemeClr val="tx1"/>
+                      </a:solidFill>
+                      <a:prstDash val="solid"/>
+                      <a:round/>
+                      <a:headEnd type="none" w="med" len="med"/>
+                      <a:tailEnd type="none" w="med" len="med"/>
+                    </a:lnL>
+                    <a:lnR w="12700" cap="flat" cmpd="sng" algn="ctr">
+                      <a:solidFill>
+                        <a:schemeClr val="tx1"/>
+                      </a:solidFill>
+                      <a:prstDash val="solid"/>
+                      <a:round/>
+                      <a:headEnd type="none" w="med" len="med"/>
+                      <a:tailEnd type="none" w="med" len="med"/>
+                    </a:lnR>
+                    <a:lnT w="12700" cap="flat" cmpd="sng" algn="ctr">
+                      <a:solidFill>
+                        <a:schemeClr val="bg1"/>
+                      </a:solidFill>
+                      <a:prstDash val="solid"/>
+                      <a:round/>
+                      <a:headEnd type="none" w="med" len="med"/>
+                      <a:tailEnd type="none" w="med" len="med"/>
+                    </a:lnT>
+                    <a:lnB w="12700" cap="flat" cmpd="sng" algn="ctr">
+                      <a:solidFill>
+                        <a:schemeClr val="tx1"/>
+                      </a:solidFill>
+                      <a:prstDash val="solid"/>
+                      <a:round/>
+                      <a:headEnd type="none" w="med" len="med"/>
+                      <a:tailEnd type="none" w="med" len="med"/>
+                    </a:lnB>
+                    <a:noFill/>
+                  </a:tcPr>
+                </a:tc>
+                <a:tc>
+                  <a:txBody>
+                    <a:bodyPr/>
+                    <a:lstStyle/>
+                    <a:p>
+                      <a:pPr algn="ctr"/>
                       <a:r>
                         <a:rPr lang="en-150" dirty="0"/>
                         <a:t>S</a:t>
@@ -6781,61 +7300,6 @@
                     <a:lstStyle/>
                     <a:p>
                       <a:pPr algn="ctr"/>
-                      <a:r>
-                        <a:rPr lang="en-150" dirty="0"/>
-                        <a:t>S</a:t>
-                      </a:r>
-                      <a:endParaRPr lang="en-GB" dirty="0"/>
-                    </a:p>
-                  </a:txBody>
-                  <a:tcPr anchor="ctr">
-                    <a:lnL w="12700" cap="flat" cmpd="sng" algn="ctr">
-                      <a:solidFill>
-                        <a:schemeClr val="tx1"/>
-                      </a:solidFill>
-                      <a:prstDash val="solid"/>
-                      <a:round/>
-                      <a:headEnd type="none" w="med" len="med"/>
-                      <a:tailEnd type="none" w="med" len="med"/>
-                    </a:lnL>
-                    <a:lnR w="12700" cap="flat" cmpd="sng" algn="ctr">
-                      <a:solidFill>
-                        <a:schemeClr val="tx1"/>
-                      </a:solidFill>
-                      <a:prstDash val="solid"/>
-                      <a:round/>
-                      <a:headEnd type="none" w="med" len="med"/>
-                      <a:tailEnd type="none" w="med" len="med"/>
-                    </a:lnR>
-                    <a:lnT w="12700" cap="flat" cmpd="sng" algn="ctr">
-                      <a:solidFill>
-                        <a:schemeClr val="bg1"/>
-                      </a:solidFill>
-                      <a:prstDash val="solid"/>
-                      <a:round/>
-                      <a:headEnd type="none" w="med" len="med"/>
-                      <a:tailEnd type="none" w="med" len="med"/>
-                    </a:lnT>
-                    <a:lnB w="12700" cap="flat" cmpd="sng" algn="ctr">
-                      <a:solidFill>
-                        <a:schemeClr val="tx1"/>
-                      </a:solidFill>
-                      <a:prstDash val="solid"/>
-                      <a:round/>
-                      <a:headEnd type="none" w="med" len="med"/>
-                      <a:tailEnd type="none" w="med" len="med"/>
-                    </a:lnB>
-                    <a:solidFill>
-                      <a:srgbClr val="5CD6C7"/>
-                    </a:solidFill>
-                  </a:tcPr>
-                </a:tc>
-                <a:tc>
-                  <a:txBody>
-                    <a:bodyPr/>
-                    <a:lstStyle/>
-                    <a:p>
-                      <a:pPr algn="ctr"/>
                       <a:endParaRPr lang="en-GB" dirty="0"/>
                     </a:p>
                   </a:txBody>
@@ -6924,6 +7388,57 @@
                       <a:headEnd type="none" w="med" len="med"/>
                       <a:tailEnd type="none" w="med" len="med"/>
                     </a:lnB>
+                  </a:tcPr>
+                </a:tc>
+                <a:tc>
+                  <a:txBody>
+                    <a:bodyPr/>
+                    <a:lstStyle/>
+                    <a:p>
+                      <a:pPr algn="ctr"/>
+                      <a:endParaRPr lang="en-GB" dirty="0"/>
+                    </a:p>
+                  </a:txBody>
+                  <a:tcPr anchor="ctr">
+                    <a:lnL w="12700" cap="flat" cmpd="sng" algn="ctr">
+                      <a:solidFill>
+                        <a:schemeClr val="tx1"/>
+                      </a:solidFill>
+                      <a:prstDash val="solid"/>
+                      <a:round/>
+                      <a:headEnd type="none" w="med" len="med"/>
+                      <a:tailEnd type="none" w="med" len="med"/>
+                    </a:lnL>
+                    <a:lnR w="12700" cap="flat" cmpd="sng" algn="ctr">
+                      <a:solidFill>
+                        <a:schemeClr val="tx1"/>
+                      </a:solidFill>
+                      <a:prstDash val="solid"/>
+                      <a:round/>
+                      <a:headEnd type="none" w="med" len="med"/>
+                      <a:tailEnd type="none" w="med" len="med"/>
+                    </a:lnR>
+                    <a:lnT w="12700" cap="flat" cmpd="sng" algn="ctr">
+                      <a:solidFill>
+                        <a:schemeClr val="bg1"/>
+                      </a:solidFill>
+                      <a:prstDash val="solid"/>
+                      <a:round/>
+                      <a:headEnd type="none" w="med" len="med"/>
+                      <a:tailEnd type="none" w="med" len="med"/>
+                    </a:lnT>
+                    <a:lnB w="12700" cap="flat" cmpd="sng" algn="ctr">
+                      <a:solidFill>
+                        <a:schemeClr val="tx1"/>
+                      </a:solidFill>
+                      <a:prstDash val="solid"/>
+                      <a:round/>
+                      <a:headEnd type="none" w="med" len="med"/>
+                      <a:tailEnd type="none" w="med" len="med"/>
+                    </a:lnB>
+                    <a:solidFill>
+                      <a:srgbClr val="5CD6C7"/>
+                    </a:solidFill>
                   </a:tcPr>
                 </a:tc>
                 <a:tc>
@@ -7832,6 +8347,54 @@
                     </a:lnB>
                   </a:tcPr>
                 </a:tc>
+                <a:tc>
+                  <a:txBody>
+                    <a:bodyPr/>
+                    <a:lstStyle/>
+                    <a:p>
+                      <a:pPr algn="ctr"/>
+                      <a:endParaRPr lang="en-GB" dirty="0"/>
+                    </a:p>
+                  </a:txBody>
+                  <a:tcPr anchor="ctr">
+                    <a:lnL w="12700" cap="flat" cmpd="sng" algn="ctr">
+                      <a:solidFill>
+                        <a:schemeClr val="tx1"/>
+                      </a:solidFill>
+                      <a:prstDash val="solid"/>
+                      <a:round/>
+                      <a:headEnd type="none" w="med" len="med"/>
+                      <a:tailEnd type="none" w="med" len="med"/>
+                    </a:lnL>
+                    <a:lnR w="12700" cap="flat" cmpd="sng" algn="ctr">
+                      <a:solidFill>
+                        <a:schemeClr val="tx1"/>
+                      </a:solidFill>
+                      <a:prstDash val="solid"/>
+                      <a:round/>
+                      <a:headEnd type="none" w="med" len="med"/>
+                      <a:tailEnd type="none" w="med" len="med"/>
+                    </a:lnR>
+                    <a:lnT w="12700" cap="flat" cmpd="sng" algn="ctr">
+                      <a:solidFill>
+                        <a:schemeClr val="tx1"/>
+                      </a:solidFill>
+                      <a:prstDash val="solid"/>
+                      <a:round/>
+                      <a:headEnd type="none" w="med" len="med"/>
+                      <a:tailEnd type="none" w="med" len="med"/>
+                    </a:lnT>
+                    <a:lnB w="12700" cap="flat" cmpd="sng" algn="ctr">
+                      <a:solidFill>
+                        <a:schemeClr val="tx1"/>
+                      </a:solidFill>
+                      <a:prstDash val="solid"/>
+                      <a:round/>
+                      <a:headEnd type="none" w="med" len="med"/>
+                      <a:tailEnd type="none" w="med" len="med"/>
+                    </a:lnB>
+                  </a:tcPr>
+                </a:tc>
                 <a:extLst>
                   <a:ext uri="{0D108BD9-81ED-4DB2-BD59-A6C34878D82A}">
                     <a16:rowId xmlns:a16="http://schemas.microsoft.com/office/drawing/2014/main" val="876731621"/>
@@ -8047,10 +8610,151 @@
                     <a:lstStyle/>
                     <a:p>
                       <a:pPr algn="ctr"/>
-                      <a:r>
-                        <a:rPr lang="en-150" dirty="0"/>
-                        <a:t>S</a:t>
-                      </a:r>
+                      <a:endParaRPr lang="en-GB" dirty="0"/>
+                    </a:p>
+                  </a:txBody>
+                  <a:tcPr anchor="ctr">
+                    <a:lnL w="12700" cap="flat" cmpd="sng" algn="ctr">
+                      <a:solidFill>
+                        <a:schemeClr val="tx1"/>
+                      </a:solidFill>
+                      <a:prstDash val="solid"/>
+                      <a:round/>
+                      <a:headEnd type="none" w="med" len="med"/>
+                      <a:tailEnd type="none" w="med" len="med"/>
+                    </a:lnL>
+                    <a:lnR w="12700" cap="flat" cmpd="sng" algn="ctr">
+                      <a:solidFill>
+                        <a:schemeClr val="tx1"/>
+                      </a:solidFill>
+                      <a:prstDash val="solid"/>
+                      <a:round/>
+                      <a:headEnd type="none" w="med" len="med"/>
+                      <a:tailEnd type="none" w="med" len="med"/>
+                    </a:lnR>
+                    <a:lnT w="12700" cap="flat" cmpd="sng" algn="ctr">
+                      <a:solidFill>
+                        <a:schemeClr val="tx1"/>
+                      </a:solidFill>
+                      <a:prstDash val="solid"/>
+                      <a:round/>
+                      <a:headEnd type="none" w="med" len="med"/>
+                      <a:tailEnd type="none" w="med" len="med"/>
+                    </a:lnT>
+                    <a:lnB w="12700" cap="flat" cmpd="sng" algn="ctr">
+                      <a:solidFill>
+                        <a:schemeClr val="tx1"/>
+                      </a:solidFill>
+                      <a:prstDash val="solid"/>
+                      <a:round/>
+                      <a:headEnd type="none" w="med" len="med"/>
+                      <a:tailEnd type="none" w="med" len="med"/>
+                    </a:lnB>
+                    <a:noFill/>
+                  </a:tcPr>
+                </a:tc>
+                <a:tc>
+                  <a:txBody>
+                    <a:bodyPr/>
+                    <a:lstStyle/>
+                    <a:p>
+                      <a:pPr algn="ctr"/>
+                      <a:endParaRPr lang="en-GB" dirty="0"/>
+                    </a:p>
+                  </a:txBody>
+                  <a:tcPr anchor="ctr">
+                    <a:lnL w="12700" cap="flat" cmpd="sng" algn="ctr">
+                      <a:solidFill>
+                        <a:schemeClr val="tx1"/>
+                      </a:solidFill>
+                      <a:prstDash val="solid"/>
+                      <a:round/>
+                      <a:headEnd type="none" w="med" len="med"/>
+                      <a:tailEnd type="none" w="med" len="med"/>
+                    </a:lnL>
+                    <a:lnR w="12700" cap="flat" cmpd="sng" algn="ctr">
+                      <a:solidFill>
+                        <a:schemeClr val="tx1"/>
+                      </a:solidFill>
+                      <a:prstDash val="solid"/>
+                      <a:round/>
+                      <a:headEnd type="none" w="med" len="med"/>
+                      <a:tailEnd type="none" w="med" len="med"/>
+                    </a:lnR>
+                    <a:lnT w="12700" cap="flat" cmpd="sng" algn="ctr">
+                      <a:solidFill>
+                        <a:schemeClr val="tx1"/>
+                      </a:solidFill>
+                      <a:prstDash val="solid"/>
+                      <a:round/>
+                      <a:headEnd type="none" w="med" len="med"/>
+                      <a:tailEnd type="none" w="med" len="med"/>
+                    </a:lnT>
+                    <a:lnB w="12700" cap="flat" cmpd="sng" algn="ctr">
+                      <a:solidFill>
+                        <a:schemeClr val="tx1"/>
+                      </a:solidFill>
+                      <a:prstDash val="solid"/>
+                      <a:round/>
+                      <a:headEnd type="none" w="med" len="med"/>
+                      <a:tailEnd type="none" w="med" len="med"/>
+                    </a:lnB>
+                  </a:tcPr>
+                </a:tc>
+                <a:tc>
+                  <a:txBody>
+                    <a:bodyPr/>
+                    <a:lstStyle/>
+                    <a:p>
+                      <a:pPr algn="ctr"/>
+                      <a:endParaRPr lang="en-GB" dirty="0"/>
+                    </a:p>
+                  </a:txBody>
+                  <a:tcPr anchor="ctr">
+                    <a:lnL w="12700" cap="flat" cmpd="sng" algn="ctr">
+                      <a:solidFill>
+                        <a:schemeClr val="tx1"/>
+                      </a:solidFill>
+                      <a:prstDash val="solid"/>
+                      <a:round/>
+                      <a:headEnd type="none" w="med" len="med"/>
+                      <a:tailEnd type="none" w="med" len="med"/>
+                    </a:lnL>
+                    <a:lnR w="12700" cap="flat" cmpd="sng" algn="ctr">
+                      <a:solidFill>
+                        <a:schemeClr val="tx1"/>
+                      </a:solidFill>
+                      <a:prstDash val="solid"/>
+                      <a:round/>
+                      <a:headEnd type="none" w="med" len="med"/>
+                      <a:tailEnd type="none" w="med" len="med"/>
+                    </a:lnR>
+                    <a:lnT w="12700" cap="flat" cmpd="sng" algn="ctr">
+                      <a:solidFill>
+                        <a:schemeClr val="tx1"/>
+                      </a:solidFill>
+                      <a:prstDash val="solid"/>
+                      <a:round/>
+                      <a:headEnd type="none" w="med" len="med"/>
+                      <a:tailEnd type="none" w="med" len="med"/>
+                    </a:lnT>
+                    <a:lnB w="12700" cap="flat" cmpd="sng" algn="ctr">
+                      <a:solidFill>
+                        <a:schemeClr val="tx1"/>
+                      </a:solidFill>
+                      <a:prstDash val="solid"/>
+                      <a:round/>
+                      <a:headEnd type="none" w="med" len="med"/>
+                      <a:tailEnd type="none" w="med" len="med"/>
+                    </a:lnB>
+                  </a:tcPr>
+                </a:tc>
+                <a:tc>
+                  <a:txBody>
+                    <a:bodyPr/>
+                    <a:lstStyle/>
+                    <a:p>
+                      <a:pPr algn="ctr"/>
                       <a:endParaRPr lang="en-GB" dirty="0"/>
                     </a:p>
                   </a:txBody>
@@ -8142,104 +8846,8 @@
                       <a:headEnd type="none" w="med" len="med"/>
                       <a:tailEnd type="none" w="med" len="med"/>
                     </a:lnB>
-                  </a:tcPr>
-                </a:tc>
-                <a:tc>
-                  <a:txBody>
-                    <a:bodyPr/>
-                    <a:lstStyle/>
-                    <a:p>
-                      <a:pPr algn="ctr"/>
-                      <a:endParaRPr lang="en-GB" dirty="0"/>
-                    </a:p>
-                  </a:txBody>
-                  <a:tcPr anchor="ctr">
-                    <a:lnL w="12700" cap="flat" cmpd="sng" algn="ctr">
-                      <a:solidFill>
-                        <a:schemeClr val="tx1"/>
-                      </a:solidFill>
-                      <a:prstDash val="solid"/>
-                      <a:round/>
-                      <a:headEnd type="none" w="med" len="med"/>
-                      <a:tailEnd type="none" w="med" len="med"/>
-                    </a:lnL>
-                    <a:lnR w="12700" cap="flat" cmpd="sng" algn="ctr">
-                      <a:solidFill>
-                        <a:schemeClr val="tx1"/>
-                      </a:solidFill>
-                      <a:prstDash val="solid"/>
-                      <a:round/>
-                      <a:headEnd type="none" w="med" len="med"/>
-                      <a:tailEnd type="none" w="med" len="med"/>
-                    </a:lnR>
-                    <a:lnT w="12700" cap="flat" cmpd="sng" algn="ctr">
-                      <a:solidFill>
-                        <a:schemeClr val="tx1"/>
-                      </a:solidFill>
-                      <a:prstDash val="solid"/>
-                      <a:round/>
-                      <a:headEnd type="none" w="med" len="med"/>
-                      <a:tailEnd type="none" w="med" len="med"/>
-                    </a:lnT>
-                    <a:lnB w="12700" cap="flat" cmpd="sng" algn="ctr">
-                      <a:solidFill>
-                        <a:schemeClr val="tx1"/>
-                      </a:solidFill>
-                      <a:prstDash val="solid"/>
-                      <a:round/>
-                      <a:headEnd type="none" w="med" len="med"/>
-                      <a:tailEnd type="none" w="med" len="med"/>
-                    </a:lnB>
-                  </a:tcPr>
-                </a:tc>
-                <a:tc>
-                  <a:txBody>
-                    <a:bodyPr/>
-                    <a:lstStyle/>
-                    <a:p>
-                      <a:pPr algn="ctr"/>
-                      <a:endParaRPr lang="en-GB" dirty="0"/>
-                    </a:p>
-                  </a:txBody>
-                  <a:tcPr anchor="ctr">
-                    <a:lnL w="12700" cap="flat" cmpd="sng" algn="ctr">
-                      <a:solidFill>
-                        <a:schemeClr val="tx1"/>
-                      </a:solidFill>
-                      <a:prstDash val="solid"/>
-                      <a:round/>
-                      <a:headEnd type="none" w="med" len="med"/>
-                      <a:tailEnd type="none" w="med" len="med"/>
-                    </a:lnL>
-                    <a:lnR w="12700" cap="flat" cmpd="sng" algn="ctr">
-                      <a:solidFill>
-                        <a:schemeClr val="tx1"/>
-                      </a:solidFill>
-                      <a:prstDash val="solid"/>
-                      <a:round/>
-                      <a:headEnd type="none" w="med" len="med"/>
-                      <a:tailEnd type="none" w="med" len="med"/>
-                    </a:lnR>
-                    <a:lnT w="12700" cap="flat" cmpd="sng" algn="ctr">
-                      <a:solidFill>
-                        <a:schemeClr val="tx1"/>
-                      </a:solidFill>
-                      <a:prstDash val="solid"/>
-                      <a:round/>
-                      <a:headEnd type="none" w="med" len="med"/>
-                      <a:tailEnd type="none" w="med" len="med"/>
-                    </a:lnT>
-                    <a:lnB w="12700" cap="flat" cmpd="sng" algn="ctr">
-                      <a:solidFill>
-                        <a:schemeClr val="tx1"/>
-                      </a:solidFill>
-                      <a:prstDash val="solid"/>
-                      <a:round/>
-                      <a:headEnd type="none" w="med" len="med"/>
-                      <a:tailEnd type="none" w="med" len="med"/>
-                    </a:lnB>
                     <a:solidFill>
-                      <a:srgbClr val="5CD6C7"/>
+                      <a:schemeClr val="bg1"/>
                     </a:solidFill>
                   </a:tcPr>
                 </a:tc>
@@ -9128,6 +9736,54 @@
                     </a:lnB>
                   </a:tcPr>
                 </a:tc>
+                <a:tc>
+                  <a:txBody>
+                    <a:bodyPr/>
+                    <a:lstStyle/>
+                    <a:p>
+                      <a:pPr algn="ctr"/>
+                      <a:endParaRPr lang="en-GB" dirty="0"/>
+                    </a:p>
+                  </a:txBody>
+                  <a:tcPr anchor="ctr">
+                    <a:lnL w="12700" cap="flat" cmpd="sng" algn="ctr">
+                      <a:solidFill>
+                        <a:schemeClr val="tx1"/>
+                      </a:solidFill>
+                      <a:prstDash val="solid"/>
+                      <a:round/>
+                      <a:headEnd type="none" w="med" len="med"/>
+                      <a:tailEnd type="none" w="med" len="med"/>
+                    </a:lnL>
+                    <a:lnR w="12700" cap="flat" cmpd="sng" algn="ctr">
+                      <a:solidFill>
+                        <a:schemeClr val="tx1"/>
+                      </a:solidFill>
+                      <a:prstDash val="solid"/>
+                      <a:round/>
+                      <a:headEnd type="none" w="med" len="med"/>
+                      <a:tailEnd type="none" w="med" len="med"/>
+                    </a:lnR>
+                    <a:lnT w="12700" cap="flat" cmpd="sng" algn="ctr">
+                      <a:solidFill>
+                        <a:schemeClr val="tx1"/>
+                      </a:solidFill>
+                      <a:prstDash val="solid"/>
+                      <a:round/>
+                      <a:headEnd type="none" w="med" len="med"/>
+                      <a:tailEnd type="none" w="med" len="med"/>
+                    </a:lnT>
+                    <a:lnB w="12700" cap="flat" cmpd="sng" algn="ctr">
+                      <a:solidFill>
+                        <a:schemeClr val="tx1"/>
+                      </a:solidFill>
+                      <a:prstDash val="solid"/>
+                      <a:round/>
+                      <a:headEnd type="none" w="med" len="med"/>
+                      <a:tailEnd type="none" w="med" len="med"/>
+                    </a:lnB>
+                  </a:tcPr>
+                </a:tc>
                 <a:extLst>
                   <a:ext uri="{0D108BD9-81ED-4DB2-BD59-A6C34878D82A}">
                     <a16:rowId xmlns:a16="http://schemas.microsoft.com/office/drawing/2014/main" val="4243924569"/>
@@ -9332,6 +9988,9 @@
                       <a:headEnd type="none" w="med" len="med"/>
                       <a:tailEnd type="none" w="med" len="med"/>
                     </a:lnB>
+                    <a:solidFill>
+                      <a:srgbClr val="5CD6C7"/>
+                    </a:solidFill>
                   </a:tcPr>
                 </a:tc>
                 <a:tc>
@@ -9380,6 +10039,57 @@
                       <a:headEnd type="none" w="med" len="med"/>
                       <a:tailEnd type="none" w="med" len="med"/>
                     </a:lnB>
+                  </a:tcPr>
+                </a:tc>
+                <a:tc>
+                  <a:txBody>
+                    <a:bodyPr/>
+                    <a:lstStyle/>
+                    <a:p>
+                      <a:pPr algn="ctr"/>
+                      <a:endParaRPr lang="en-GB" dirty="0"/>
+                    </a:p>
+                  </a:txBody>
+                  <a:tcPr anchor="ctr">
+                    <a:lnL w="12700" cap="flat" cmpd="sng" algn="ctr">
+                      <a:solidFill>
+                        <a:schemeClr val="tx1"/>
+                      </a:solidFill>
+                      <a:prstDash val="solid"/>
+                      <a:round/>
+                      <a:headEnd type="none" w="med" len="med"/>
+                      <a:tailEnd type="none" w="med" len="med"/>
+                    </a:lnL>
+                    <a:lnR w="12700" cap="flat" cmpd="sng" algn="ctr">
+                      <a:solidFill>
+                        <a:schemeClr val="tx1"/>
+                      </a:solidFill>
+                      <a:prstDash val="solid"/>
+                      <a:round/>
+                      <a:headEnd type="none" w="med" len="med"/>
+                      <a:tailEnd type="none" w="med" len="med"/>
+                    </a:lnR>
+                    <a:lnT w="12700" cap="flat" cmpd="sng" algn="ctr">
+                      <a:solidFill>
+                        <a:schemeClr val="tx1"/>
+                      </a:solidFill>
+                      <a:prstDash val="solid"/>
+                      <a:round/>
+                      <a:headEnd type="none" w="med" len="med"/>
+                      <a:tailEnd type="none" w="med" len="med"/>
+                    </a:lnT>
+                    <a:lnB w="12700" cap="flat" cmpd="sng" algn="ctr">
+                      <a:solidFill>
+                        <a:schemeClr val="tx1"/>
+                      </a:solidFill>
+                      <a:prstDash val="solid"/>
+                      <a:round/>
+                      <a:headEnd type="none" w="med" len="med"/>
+                      <a:tailEnd type="none" w="med" len="med"/>
+                    </a:lnB>
+                    <a:solidFill>
+                      <a:srgbClr val="5CD6C7"/>
+                    </a:solidFill>
                   </a:tcPr>
                 </a:tc>
                 <a:tc>
@@ -10158,7 +10868,7 @@
         </p:nvSpPr>
         <p:spPr>
           <a:xfrm>
-            <a:off x="628650" y="3563878"/>
+            <a:off x="628650" y="3590511"/>
             <a:ext cx="1198486" cy="369332"/>
           </a:xfrm>
           <a:prstGeom prst="rect">
@@ -10242,7 +10952,7 @@
           <a:p>
             <a:r>
               <a:rPr lang="en-150" dirty="0"/>
-              <a:t>Conceptual Design</a:t>
+              <a:t>Data Flow</a:t>
             </a:r>
             <a:endParaRPr lang="en-GB" dirty="0"/>
           </a:p>
@@ -10272,6 +10982,307 @@
             <a:fld id="{4847D3C8-23C8-4144-AEB0-562812491F0A}" type="slidenum">
               <a:rPr lang="en-GB" smtClean="0"/>
               <a:t>6</a:t>
+            </a:fld>
+            <a:endParaRPr lang="en-GB"/>
+          </a:p>
+        </p:txBody>
+      </p:sp>
+      <p:pic>
+        <p:nvPicPr>
+          <p:cNvPr id="1026" name="Picture 2">
+            <a:extLst>
+              <a:ext uri="{FF2B5EF4-FFF2-40B4-BE49-F238E27FC236}">
+                <a16:creationId xmlns:a16="http://schemas.microsoft.com/office/drawing/2014/main" id="{AA86DCCB-147D-49E7-B434-6C90F185967D}"/>
+              </a:ext>
+            </a:extLst>
+          </p:cNvPr>
+          <p:cNvPicPr>
+            <a:picLocks noChangeAspect="1" noChangeArrowheads="1"/>
+          </p:cNvPicPr>
+          <p:nvPr/>
+        </p:nvPicPr>
+        <p:blipFill>
+          <a:blip r:embed="rId2">
+            <a:extLst>
+              <a:ext uri="{28A0092B-C50C-407E-A947-70E740481C1C}">
+                <a14:useLocalDpi xmlns:a14="http://schemas.microsoft.com/office/drawing/2010/main" val="0"/>
+              </a:ext>
+            </a:extLst>
+          </a:blip>
+          <a:srcRect/>
+          <a:stretch>
+            <a:fillRect/>
+          </a:stretch>
+        </p:blipFill>
+        <p:spPr bwMode="auto">
+          <a:xfrm>
+            <a:off x="776796" y="1892671"/>
+            <a:ext cx="7590407" cy="4261697"/>
+          </a:xfrm>
+          <a:prstGeom prst="rect">
+            <a:avLst/>
+          </a:prstGeom>
+          <a:noFill/>
+          <a:extLst>
+            <a:ext uri="{909E8E84-426E-40DD-AFC4-6F175D3DCCD1}">
+              <a14:hiddenFill xmlns:a14="http://schemas.microsoft.com/office/drawing/2010/main">
+                <a:solidFill>
+                  <a:srgbClr val="FFFFFF"/>
+                </a:solidFill>
+              </a14:hiddenFill>
+            </a:ext>
+          </a:extLst>
+        </p:spPr>
+      </p:pic>
+    </p:spTree>
+    <p:extLst>
+      <p:ext uri="{BB962C8B-B14F-4D97-AF65-F5344CB8AC3E}">
+        <p14:creationId xmlns:p14="http://schemas.microsoft.com/office/powerpoint/2010/main" val="3759918798"/>
+      </p:ext>
+    </p:extLst>
+  </p:cSld>
+  <p:clrMapOvr>
+    <a:masterClrMapping/>
+  </p:clrMapOvr>
+</p:sld>
+</file>
+
+<file path=ppt/slides/slide7.xml><?xml version="1.0" encoding="utf-8"?>
+<p:sld xmlns:a="http://schemas.openxmlformats.org/drawingml/2006/main" xmlns:r="http://schemas.openxmlformats.org/officeDocument/2006/relationships" xmlns:p="http://schemas.openxmlformats.org/presentationml/2006/main">
+  <p:cSld>
+    <p:spTree>
+      <p:nvGrpSpPr>
+        <p:cNvPr id="1" name=""/>
+        <p:cNvGrpSpPr/>
+        <p:nvPr/>
+      </p:nvGrpSpPr>
+      <p:grpSpPr>
+        <a:xfrm>
+          <a:off x="0" y="0"/>
+          <a:ext cx="0" cy="0"/>
+          <a:chOff x="0" y="0"/>
+          <a:chExt cx="0" cy="0"/>
+        </a:xfrm>
+      </p:grpSpPr>
+      <p:sp>
+        <p:nvSpPr>
+          <p:cNvPr id="2" name="Title 1">
+            <a:extLst>
+              <a:ext uri="{FF2B5EF4-FFF2-40B4-BE49-F238E27FC236}">
+                <a16:creationId xmlns:a16="http://schemas.microsoft.com/office/drawing/2014/main" id="{89686510-CCE5-47B0-9E60-81988F17DE33}"/>
+              </a:ext>
+            </a:extLst>
+          </p:cNvPr>
+          <p:cNvSpPr>
+            <a:spLocks noGrp="1"/>
+          </p:cNvSpPr>
+          <p:nvPr>
+            <p:ph type="title"/>
+          </p:nvPr>
+        </p:nvSpPr>
+        <p:spPr/>
+        <p:txBody>
+          <a:bodyPr/>
+          <a:lstStyle/>
+          <a:p>
+            <a:r>
+              <a:rPr lang="en-150" dirty="0"/>
+              <a:t>Dashboards</a:t>
+            </a:r>
+            <a:endParaRPr lang="en-GB" dirty="0"/>
+          </a:p>
+        </p:txBody>
+      </p:sp>
+      <p:sp>
+        <p:nvSpPr>
+          <p:cNvPr id="4" name="Slide Number Placeholder 3">
+            <a:extLst>
+              <a:ext uri="{FF2B5EF4-FFF2-40B4-BE49-F238E27FC236}">
+                <a16:creationId xmlns:a16="http://schemas.microsoft.com/office/drawing/2014/main" id="{BD3F8FCB-E85C-4EB1-A5D1-1B739E165148}"/>
+              </a:ext>
+            </a:extLst>
+          </p:cNvPr>
+          <p:cNvSpPr>
+            <a:spLocks noGrp="1"/>
+          </p:cNvSpPr>
+          <p:nvPr>
+            <p:ph type="sldNum" sz="quarter" idx="12"/>
+          </p:nvPr>
+        </p:nvSpPr>
+        <p:spPr/>
+        <p:txBody>
+          <a:bodyPr/>
+          <a:lstStyle/>
+          <a:p>
+            <a:fld id="{4847D3C8-23C8-4144-AEB0-562812491F0A}" type="slidenum">
+              <a:rPr lang="en-GB" smtClean="0"/>
+              <a:t>7</a:t>
+            </a:fld>
+            <a:endParaRPr lang="en-GB"/>
+          </a:p>
+        </p:txBody>
+      </p:sp>
+      <p:sp>
+        <p:nvSpPr>
+          <p:cNvPr id="5" name="TextBox 4">
+            <a:extLst>
+              <a:ext uri="{FF2B5EF4-FFF2-40B4-BE49-F238E27FC236}">
+                <a16:creationId xmlns:a16="http://schemas.microsoft.com/office/drawing/2014/main" id="{C94D8066-FE52-4CBD-B878-A34F366A9995}"/>
+              </a:ext>
+            </a:extLst>
+          </p:cNvPr>
+          <p:cNvSpPr txBox="1"/>
+          <p:nvPr/>
+        </p:nvSpPr>
+        <p:spPr>
+          <a:xfrm>
+            <a:off x="939367" y="2505670"/>
+            <a:ext cx="6340321" cy="1938992"/>
+          </a:xfrm>
+          <a:prstGeom prst="rect">
+            <a:avLst/>
+          </a:prstGeom>
+          <a:noFill/>
+        </p:spPr>
+        <p:txBody>
+          <a:bodyPr wrap="square" rtlCol="0">
+            <a:spAutoFit/>
+          </a:bodyPr>
+          <a:lstStyle/>
+          <a:p>
+            <a:r>
+              <a:rPr lang="en-150" dirty="0">
+                <a:latin typeface="IBM Plex Mono" panose="020B0509050203000203" pitchFamily="49" charset="0"/>
+              </a:rPr>
+              <a:t>A server with dashboards where the programme can track participation, selection rates, etc.</a:t>
+            </a:r>
+          </a:p>
+          <a:p>
+            <a:endParaRPr lang="en-150" dirty="0">
+              <a:latin typeface="IBM Plex Mono" panose="020B0509050203000203" pitchFamily="49" charset="0"/>
+            </a:endParaRPr>
+          </a:p>
+          <a:p>
+            <a:r>
+              <a:rPr lang="en-150" dirty="0">
+                <a:latin typeface="IBM Plex Mono" panose="020B0509050203000203" pitchFamily="49" charset="0"/>
+              </a:rPr>
+              <a:t>www.muvadashboards.mz</a:t>
+            </a:r>
+          </a:p>
+          <a:p>
+            <a:endParaRPr lang="en-150" dirty="0">
+              <a:latin typeface="IBM Plex Mono" panose="020B0509050203000203" pitchFamily="49" charset="0"/>
+            </a:endParaRPr>
+          </a:p>
+          <a:p>
+            <a:r>
+              <a:rPr lang="en-150" sz="1200" i="1" dirty="0">
+                <a:latin typeface="IBM Plex Mono" panose="020B0509050203000203" pitchFamily="49" charset="0"/>
+              </a:rPr>
+              <a:t>*Ideally the team builds capacity to produce and </a:t>
+            </a:r>
+            <a:r>
+              <a:rPr lang="en-150" sz="1200" i="1" dirty="0" err="1">
+                <a:latin typeface="IBM Plex Mono" panose="020B0509050203000203" pitchFamily="49" charset="0"/>
+              </a:rPr>
+              <a:t>mantain</a:t>
+            </a:r>
+            <a:r>
+              <a:rPr lang="en-150" sz="1200" i="1" dirty="0">
+                <a:latin typeface="IBM Plex Mono" panose="020B0509050203000203" pitchFamily="49" charset="0"/>
+              </a:rPr>
+              <a:t> these.</a:t>
+            </a:r>
+            <a:endParaRPr lang="en-GB" sz="1200" i="1" dirty="0">
+              <a:latin typeface="IBM Plex Mono" panose="020B0509050203000203" pitchFamily="49" charset="0"/>
+            </a:endParaRPr>
+          </a:p>
+        </p:txBody>
+      </p:sp>
+    </p:spTree>
+    <p:extLst>
+      <p:ext uri="{BB962C8B-B14F-4D97-AF65-F5344CB8AC3E}">
+        <p14:creationId xmlns:p14="http://schemas.microsoft.com/office/powerpoint/2010/main" val="3107362265"/>
+      </p:ext>
+    </p:extLst>
+  </p:cSld>
+  <p:clrMapOvr>
+    <a:masterClrMapping/>
+  </p:clrMapOvr>
+</p:sld>
+</file>
+
+<file path=ppt/slides/slide8.xml><?xml version="1.0" encoding="utf-8"?>
+<p:sld xmlns:a="http://schemas.openxmlformats.org/drawingml/2006/main" xmlns:r="http://schemas.openxmlformats.org/officeDocument/2006/relationships" xmlns:p="http://schemas.openxmlformats.org/presentationml/2006/main">
+  <p:cSld>
+    <p:spTree>
+      <p:nvGrpSpPr>
+        <p:cNvPr id="1" name=""/>
+        <p:cNvGrpSpPr/>
+        <p:nvPr/>
+      </p:nvGrpSpPr>
+      <p:grpSpPr>
+        <a:xfrm>
+          <a:off x="0" y="0"/>
+          <a:ext cx="0" cy="0"/>
+          <a:chOff x="0" y="0"/>
+          <a:chExt cx="0" cy="0"/>
+        </a:xfrm>
+      </p:grpSpPr>
+      <p:sp>
+        <p:nvSpPr>
+          <p:cNvPr id="2" name="Title 1">
+            <a:extLst>
+              <a:ext uri="{FF2B5EF4-FFF2-40B4-BE49-F238E27FC236}">
+                <a16:creationId xmlns:a16="http://schemas.microsoft.com/office/drawing/2014/main" id="{89686510-CCE5-47B0-9E60-81988F17DE33}"/>
+              </a:ext>
+            </a:extLst>
+          </p:cNvPr>
+          <p:cNvSpPr>
+            <a:spLocks noGrp="1"/>
+          </p:cNvSpPr>
+          <p:nvPr>
+            <p:ph type="title"/>
+          </p:nvPr>
+        </p:nvSpPr>
+        <p:spPr/>
+        <p:txBody>
+          <a:bodyPr/>
+          <a:lstStyle/>
+          <a:p>
+            <a:r>
+              <a:rPr lang="en-150" dirty="0"/>
+              <a:t>Conceptual Design</a:t>
+            </a:r>
+            <a:endParaRPr lang="en-GB" dirty="0"/>
+          </a:p>
+        </p:txBody>
+      </p:sp>
+      <p:sp>
+        <p:nvSpPr>
+          <p:cNvPr id="4" name="Slide Number Placeholder 3">
+            <a:extLst>
+              <a:ext uri="{FF2B5EF4-FFF2-40B4-BE49-F238E27FC236}">
+                <a16:creationId xmlns:a16="http://schemas.microsoft.com/office/drawing/2014/main" id="{BD3F8FCB-E85C-4EB1-A5D1-1B739E165148}"/>
+              </a:ext>
+            </a:extLst>
+          </p:cNvPr>
+          <p:cNvSpPr>
+            <a:spLocks noGrp="1"/>
+          </p:cNvSpPr>
+          <p:nvPr>
+            <p:ph type="sldNum" sz="quarter" idx="12"/>
+          </p:nvPr>
+        </p:nvSpPr>
+        <p:spPr/>
+        <p:txBody>
+          <a:bodyPr/>
+          <a:lstStyle/>
+          <a:p>
+            <a:fld id="{4847D3C8-23C8-4144-AEB0-562812491F0A}" type="slidenum">
+              <a:rPr lang="en-GB" smtClean="0"/>
+              <a:t>8</a:t>
             </a:fld>
             <a:endParaRPr lang="en-GB"/>
           </a:p>
@@ -10325,174 +11336,7 @@
 </p:sld>
 </file>
 
-<file path=ppt/slides/slide7.xml><?xml version="1.0" encoding="utf-8"?>
-<p:sld xmlns:a="http://schemas.openxmlformats.org/drawingml/2006/main" xmlns:r="http://schemas.openxmlformats.org/officeDocument/2006/relationships" xmlns:p="http://schemas.openxmlformats.org/presentationml/2006/main">
-  <p:cSld>
-    <p:spTree>
-      <p:nvGrpSpPr>
-        <p:cNvPr id="1" name=""/>
-        <p:cNvGrpSpPr/>
-        <p:nvPr/>
-      </p:nvGrpSpPr>
-      <p:grpSpPr>
-        <a:xfrm>
-          <a:off x="0" y="0"/>
-          <a:ext cx="0" cy="0"/>
-          <a:chOff x="0" y="0"/>
-          <a:chExt cx="0" cy="0"/>
-        </a:xfrm>
-      </p:grpSpPr>
-      <p:sp>
-        <p:nvSpPr>
-          <p:cNvPr id="2" name="Title 1">
-            <a:extLst>
-              <a:ext uri="{FF2B5EF4-FFF2-40B4-BE49-F238E27FC236}">
-                <a16:creationId xmlns:a16="http://schemas.microsoft.com/office/drawing/2014/main" id="{3C2D0ABF-178F-46EF-825C-235F4CA8BB19}"/>
-              </a:ext>
-            </a:extLst>
-          </p:cNvPr>
-          <p:cNvSpPr>
-            <a:spLocks noGrp="1"/>
-          </p:cNvSpPr>
-          <p:nvPr>
-            <p:ph type="title"/>
-          </p:nvPr>
-        </p:nvSpPr>
-        <p:spPr/>
-        <p:txBody>
-          <a:bodyPr/>
-          <a:lstStyle/>
-          <a:p>
-            <a:r>
-              <a:rPr lang="en-150" dirty="0"/>
-              <a:t>Software </a:t>
-            </a:r>
-            <a:endParaRPr lang="en-GB" dirty="0"/>
-          </a:p>
-        </p:txBody>
-      </p:sp>
-      <p:sp>
-        <p:nvSpPr>
-          <p:cNvPr id="3" name="Content Placeholder 2">
-            <a:extLst>
-              <a:ext uri="{FF2B5EF4-FFF2-40B4-BE49-F238E27FC236}">
-                <a16:creationId xmlns:a16="http://schemas.microsoft.com/office/drawing/2014/main" id="{23906B84-CC64-435B-9AA1-4091ABBC2CBB}"/>
-              </a:ext>
-            </a:extLst>
-          </p:cNvPr>
-          <p:cNvSpPr>
-            <a:spLocks noGrp="1"/>
-          </p:cNvSpPr>
-          <p:nvPr>
-            <p:ph idx="1"/>
-          </p:nvPr>
-        </p:nvSpPr>
-        <p:spPr/>
-        <p:txBody>
-          <a:bodyPr>
-            <a:normAutofit fontScale="85000" lnSpcReduction="20000"/>
-          </a:bodyPr>
-          <a:lstStyle/>
-          <a:p>
-            <a:r>
-              <a:rPr lang="en-150" dirty="0"/>
-              <a:t>Zoho creator: create an account for MUVA and set credentials to allow the creation of users, pages, reports (about 240 EUR/month)</a:t>
-            </a:r>
-          </a:p>
-          <a:p>
-            <a:endParaRPr lang="en-150" dirty="0"/>
-          </a:p>
-          <a:p>
-            <a:r>
-              <a:rPr lang="en-150" dirty="0"/>
-              <a:t>A server to host dashboards and a domain for the data entry.(currently using mine) (about 20 EUR/month)</a:t>
-            </a:r>
-          </a:p>
-          <a:p>
-            <a:endParaRPr lang="en-150" dirty="0"/>
-          </a:p>
-          <a:p>
-            <a:r>
-              <a:rPr lang="en-150" dirty="0"/>
-              <a:t>Survey Solutions server (about 20 EUR /month). </a:t>
-            </a:r>
-            <a:r>
-              <a:rPr lang="en-GB" dirty="0"/>
-              <a:t>C</a:t>
-            </a:r>
-            <a:r>
-              <a:rPr lang="en-150" dirty="0"/>
-              <a:t>currently using mine</a:t>
-            </a:r>
-          </a:p>
-          <a:p>
-            <a:endParaRPr lang="en-150" dirty="0"/>
-          </a:p>
-          <a:p>
-            <a:r>
-              <a:rPr lang="en-150" dirty="0"/>
-              <a:t>Stata/R</a:t>
-            </a:r>
-          </a:p>
-          <a:p>
-            <a:pPr marL="0" indent="0">
-              <a:buNone/>
-            </a:pPr>
-            <a:endParaRPr lang="en-150" dirty="0"/>
-          </a:p>
-          <a:p>
-            <a:endParaRPr lang="en-GB" dirty="0"/>
-          </a:p>
-        </p:txBody>
-      </p:sp>
-      <p:sp>
-        <p:nvSpPr>
-          <p:cNvPr id="4" name="Slide Number Placeholder 3">
-            <a:extLst>
-              <a:ext uri="{FF2B5EF4-FFF2-40B4-BE49-F238E27FC236}">
-                <a16:creationId xmlns:a16="http://schemas.microsoft.com/office/drawing/2014/main" id="{25808265-F46B-48B3-9050-FA2114FD94D0}"/>
-              </a:ext>
-            </a:extLst>
-          </p:cNvPr>
-          <p:cNvSpPr>
-            <a:spLocks noGrp="1"/>
-          </p:cNvSpPr>
-          <p:nvPr>
-            <p:ph type="sldNum" sz="quarter" idx="12"/>
-          </p:nvPr>
-        </p:nvSpPr>
-        <p:spPr/>
-        <p:txBody>
-          <a:bodyPr/>
-          <a:lstStyle/>
-          <a:p>
-            <a:fld id="{4847D3C8-23C8-4144-AEB0-562812491F0A}" type="slidenum">
-              <a:rPr lang="en-GB" smtClean="0"/>
-              <a:t>7</a:t>
-            </a:fld>
-            <a:endParaRPr lang="en-GB"/>
-          </a:p>
-        </p:txBody>
-      </p:sp>
-    </p:spTree>
-    <p:extLst>
-      <p:ext uri="{BB962C8B-B14F-4D97-AF65-F5344CB8AC3E}">
-        <p14:creationId xmlns:p14="http://schemas.microsoft.com/office/powerpoint/2010/main" val="3054526697"/>
-      </p:ext>
-    </p:extLst>
-  </p:cSld>
-  <p:clrMapOvr>
-    <a:masterClrMapping/>
-  </p:clrMapOvr>
-  <p:extLst>
-    <p:ext uri="{6950BFC3-D8DA-4A85-94F7-54DA5524770B}">
-      <p188:commentRel xmlns:p188="http://schemas.microsoft.com/office/powerpoint/2018/8/main" r:id="rId2"/>
-    </p:ext>
-  </p:extLst>
-</p:sld>
-</file>
-
-<file path=ppt/slides/slide8.xml><?xml version="1.0" encoding="utf-8"?>
+<file path=ppt/slides/slide9.xml><?xml version="1.0" encoding="utf-8"?>
 <p:sld xmlns:a="http://schemas.openxmlformats.org/drawingml/2006/main" xmlns:r="http://schemas.openxmlformats.org/officeDocument/2006/relationships" xmlns:p="http://schemas.openxmlformats.org/presentationml/2006/main">
   <p:cSld>
     <p:spTree>
@@ -10568,7 +11412,7 @@
           <a:p>
             <a:r>
               <a:rPr lang="en-150" dirty="0"/>
-              <a:t>Developers: Andres, Dercio, Tercio, Manuel (?)</a:t>
+              <a:t>Developers: Andres, Dercio, Tercio, Manuel, Paul (who else?)</a:t>
             </a:r>
           </a:p>
           <a:p>
@@ -10577,8 +11421,17 @@
           <a:p>
             <a:r>
               <a:rPr lang="en-150" dirty="0"/>
-              <a:t>Enters data for MEL: MEL team, Manuel QA’s</a:t>
-            </a:r>
+              <a:t>Enters data for MEL: MEL team, Manuel Q</a:t>
+            </a:r>
+            <a:r>
+              <a:rPr lang="en-GB" dirty="0"/>
+              <a:t>a</a:t>
+            </a:r>
+            <a:r>
+              <a:rPr lang="en-150"/>
+              <a:t>s.</a:t>
+            </a:r>
+            <a:endParaRPr lang="en-150" dirty="0"/>
           </a:p>
           <a:p>
             <a:endParaRPr lang="en-150" dirty="0"/>
@@ -10594,7 +11447,7 @@
             </a:r>
             <a:r>
               <a:rPr lang="en-150" dirty="0"/>
-              <a:t>: PM of each project, (?) supervises</a:t>
+              <a:t>: PM of each project, line managers QA.</a:t>
             </a:r>
           </a:p>
           <a:p>
@@ -10644,7 +11497,7 @@
           <a:p>
             <a:fld id="{4847D3C8-23C8-4144-AEB0-562812491F0A}" type="slidenum">
               <a:rPr lang="en-GB" smtClean="0"/>
-              <a:t>8</a:t>
+              <a:t>9</a:t>
             </a:fld>
             <a:endParaRPr lang="en-GB"/>
           </a:p>
@@ -10660,221 +11513,6 @@
   <p:clrMapOvr>
     <a:masterClrMapping/>
   </p:clrMapOvr>
-</p:sld>
-</file>
-
-<file path=ppt/slides/slide9.xml><?xml version="1.0" encoding="utf-8"?>
-<p:sld xmlns:a="http://schemas.openxmlformats.org/drawingml/2006/main" xmlns:r="http://schemas.openxmlformats.org/officeDocument/2006/relationships" xmlns:p="http://schemas.openxmlformats.org/presentationml/2006/main">
-  <p:cSld>
-    <p:spTree>
-      <p:nvGrpSpPr>
-        <p:cNvPr id="1" name=""/>
-        <p:cNvGrpSpPr/>
-        <p:nvPr/>
-      </p:nvGrpSpPr>
-      <p:grpSpPr>
-        <a:xfrm>
-          <a:off x="0" y="0"/>
-          <a:ext cx="0" cy="0"/>
-          <a:chOff x="0" y="0"/>
-          <a:chExt cx="0" cy="0"/>
-        </a:xfrm>
-      </p:grpSpPr>
-      <p:sp>
-        <p:nvSpPr>
-          <p:cNvPr id="2" name="Title 1">
-            <a:extLst>
-              <a:ext uri="{FF2B5EF4-FFF2-40B4-BE49-F238E27FC236}">
-                <a16:creationId xmlns:a16="http://schemas.microsoft.com/office/drawing/2014/main" id="{B5189EB2-DCF9-452B-89CA-776943195F33}"/>
-              </a:ext>
-            </a:extLst>
-          </p:cNvPr>
-          <p:cNvSpPr>
-            <a:spLocks noGrp="1"/>
-          </p:cNvSpPr>
-          <p:nvPr>
-            <p:ph type="title"/>
-          </p:nvPr>
-        </p:nvSpPr>
-        <p:spPr/>
-        <p:txBody>
-          <a:bodyPr/>
-          <a:lstStyle/>
-          <a:p>
-            <a:r>
-              <a:rPr lang="en-150" dirty="0"/>
-              <a:t>Pilot phase</a:t>
-            </a:r>
-            <a:endParaRPr lang="en-GB" dirty="0"/>
-          </a:p>
-        </p:txBody>
-      </p:sp>
-      <p:sp>
-        <p:nvSpPr>
-          <p:cNvPr id="3" name="Content Placeholder 2">
-            <a:extLst>
-              <a:ext uri="{FF2B5EF4-FFF2-40B4-BE49-F238E27FC236}">
-                <a16:creationId xmlns:a16="http://schemas.microsoft.com/office/drawing/2014/main" id="{A4353444-3D10-44F5-B8E1-2ECF52F48634}"/>
-              </a:ext>
-            </a:extLst>
-          </p:cNvPr>
-          <p:cNvSpPr>
-            <a:spLocks noGrp="1"/>
-          </p:cNvSpPr>
-          <p:nvPr>
-            <p:ph idx="1"/>
-          </p:nvPr>
-        </p:nvSpPr>
-        <p:spPr/>
-        <p:txBody>
-          <a:bodyPr>
-            <a:normAutofit fontScale="70000" lnSpcReduction="20000"/>
-          </a:bodyPr>
-          <a:lstStyle/>
-          <a:p>
-            <a:r>
-              <a:rPr lang="en-150" dirty="0"/>
-              <a:t>Log all MUVA projects and test which information is relevant</a:t>
-            </a:r>
-          </a:p>
-          <a:p>
-            <a:pPr marL="0" indent="0">
-              <a:buNone/>
-            </a:pPr>
-            <a:endParaRPr lang="en-150" dirty="0"/>
-          </a:p>
-          <a:p>
-            <a:r>
-              <a:rPr lang="en-150" dirty="0"/>
-              <a:t>Choose 2 active projects</a:t>
-            </a:r>
-          </a:p>
-          <a:p>
-            <a:endParaRPr lang="en-150" dirty="0"/>
-          </a:p>
-          <a:p>
-            <a:r>
-              <a:rPr lang="en-GB" dirty="0"/>
-              <a:t>T</a:t>
-            </a:r>
-            <a:r>
-              <a:rPr lang="en-150" dirty="0" err="1"/>
-              <a:t>est</a:t>
-            </a:r>
-            <a:r>
-              <a:rPr lang="en-150" dirty="0"/>
-              <a:t> the unique ID </a:t>
-            </a:r>
-            <a:r>
-              <a:rPr lang="en-150"/>
-              <a:t>system </a:t>
-            </a:r>
-            <a:endParaRPr lang="en-150" dirty="0"/>
-          </a:p>
-          <a:p>
-            <a:pPr marL="0" indent="0">
-              <a:buNone/>
-            </a:pPr>
-            <a:r>
-              <a:rPr lang="en-150" dirty="0"/>
-              <a:t> </a:t>
-            </a:r>
-          </a:p>
-          <a:p>
-            <a:r>
-              <a:rPr lang="en-150" dirty="0"/>
-              <a:t>Test ongoing monitoring of attendance or transfers</a:t>
-            </a:r>
-          </a:p>
-          <a:p>
-            <a:pPr marL="0" indent="0">
-              <a:buNone/>
-            </a:pPr>
-            <a:endParaRPr lang="en-150" dirty="0"/>
-          </a:p>
-          <a:p>
-            <a:r>
-              <a:rPr lang="en-150" dirty="0"/>
-              <a:t>Test process of ongoing learning</a:t>
-            </a:r>
-          </a:p>
-          <a:p>
-            <a:pPr marL="0" indent="0">
-              <a:buNone/>
-            </a:pPr>
-            <a:endParaRPr lang="en-150" dirty="0"/>
-          </a:p>
-          <a:p>
-            <a:r>
-              <a:rPr lang="en-150" dirty="0"/>
-              <a:t>Test </a:t>
-            </a:r>
-            <a:r>
-              <a:rPr lang="en-150" dirty="0" err="1"/>
-              <a:t>rastreamiento</a:t>
-            </a:r>
-            <a:r>
-              <a:rPr lang="en-150" dirty="0"/>
-              <a:t> </a:t>
-            </a:r>
-            <a:r>
-              <a:rPr lang="en-150" dirty="0" err="1"/>
-              <a:t>sistemico</a:t>
-            </a:r>
-            <a:endParaRPr lang="en-150" dirty="0"/>
-          </a:p>
-          <a:p>
-            <a:pPr marL="0" indent="0">
-              <a:buNone/>
-            </a:pPr>
-            <a:endParaRPr lang="en-GB" dirty="0"/>
-          </a:p>
-        </p:txBody>
-      </p:sp>
-      <p:sp>
-        <p:nvSpPr>
-          <p:cNvPr id="4" name="Slide Number Placeholder 3">
-            <a:extLst>
-              <a:ext uri="{FF2B5EF4-FFF2-40B4-BE49-F238E27FC236}">
-                <a16:creationId xmlns:a16="http://schemas.microsoft.com/office/drawing/2014/main" id="{5F4500E1-976F-4FAB-9146-1DE2F5420CC4}"/>
-              </a:ext>
-            </a:extLst>
-          </p:cNvPr>
-          <p:cNvSpPr>
-            <a:spLocks noGrp="1"/>
-          </p:cNvSpPr>
-          <p:nvPr>
-            <p:ph type="sldNum" sz="quarter" idx="12"/>
-          </p:nvPr>
-        </p:nvSpPr>
-        <p:spPr/>
-        <p:txBody>
-          <a:bodyPr/>
-          <a:lstStyle/>
-          <a:p>
-            <a:fld id="{4847D3C8-23C8-4144-AEB0-562812491F0A}" type="slidenum">
-              <a:rPr lang="en-GB" smtClean="0"/>
-              <a:t>9</a:t>
-            </a:fld>
-            <a:endParaRPr lang="en-GB"/>
-          </a:p>
-        </p:txBody>
-      </p:sp>
-    </p:spTree>
-    <p:extLst>
-      <p:ext uri="{BB962C8B-B14F-4D97-AF65-F5344CB8AC3E}">
-        <p14:creationId xmlns:p14="http://schemas.microsoft.com/office/powerpoint/2010/main" val="1454998199"/>
-      </p:ext>
-    </p:extLst>
-  </p:cSld>
-  <p:clrMapOvr>
-    <a:masterClrMapping/>
-  </p:clrMapOvr>
-  <p:extLst>
-    <p:ext uri="{6950BFC3-D8DA-4A85-94F7-54DA5524770B}">
-      <p188:commentRel xmlns:p188="http://schemas.microsoft.com/office/powerpoint/2018/8/main" r:id="rId2"/>
-    </p:ext>
-  </p:extLst>
 </p:sld>
 </file>
 

</xml_diff>